<commit_message>
ALFDevOps.pptx - Updated Slide # 6 to include 4 Ops work types
</commit_message>
<xml_diff>
--- a/ALFDevOps.pptx
+++ b/ALFDevOps.pptx
@@ -13,7 +13,7 @@
     <p:sldId id="315" r:id="rId4"/>
     <p:sldId id="257" r:id="rId5"/>
     <p:sldId id="258" r:id="rId6"/>
-    <p:sldId id="260" r:id="rId7"/>
+    <p:sldId id="325" r:id="rId7"/>
     <p:sldId id="322" r:id="rId8"/>
     <p:sldId id="319" r:id="rId9"/>
     <p:sldId id="318" r:id="rId10"/>
@@ -6578,8 +6578,8 @@
     <dgm:cxn modelId="{CD10E10E-D1C7-134F-B952-5AF52FC4E690}" srcId="{A7C267B5-FD16-EC4D-BE03-7A816628904A}" destId="{B627CFA2-6EFD-9043-B89A-CDED44F0F122}" srcOrd="2" destOrd="0" parTransId="{9317F3F0-6D5D-5445-8E8D-E3121F59934C}" sibTransId="{379C5149-0F22-EB49-B0AB-FEA569BAEBFA}"/>
     <dgm:cxn modelId="{39A61D23-CBAD-EB4F-AEC9-8C264E598D7A}" type="presOf" srcId="{7B35A379-D164-7646-B4D0-0CD073B9D4F5}" destId="{708441A5-B6B4-1846-93D8-389FB7CF65C3}" srcOrd="1" destOrd="0" presId="urn:microsoft.com/office/officeart/2005/8/layout/lProcess2"/>
     <dgm:cxn modelId="{49A3D346-C1DC-3C4E-91AE-E441EC48701A}" srcId="{A7C267B5-FD16-EC4D-BE03-7A816628904A}" destId="{6146631F-BC49-1541-B0E7-845E36AA1622}" srcOrd="0" destOrd="0" parTransId="{381F4946-B0BC-514A-9359-363B77F3A029}" sibTransId="{B8020DB6-C890-6143-8CCF-ED94BF3306C4}"/>
+    <dgm:cxn modelId="{F096C520-758A-5D49-8651-179AA3120D78}" type="presOf" srcId="{5E5733B1-5C32-F547-80D4-E4B096BF03CA}" destId="{5698ACED-139F-2045-B418-094D89CA2898}" srcOrd="0" destOrd="0" presId="urn:microsoft.com/office/officeart/2005/8/layout/lProcess2"/>
     <dgm:cxn modelId="{355AE86F-6A26-4944-A341-356888262281}" type="presOf" srcId="{6146631F-BC49-1541-B0E7-845E36AA1622}" destId="{00FBA305-74BC-7F4E-BC9E-FD61B00BBA6F}" srcOrd="0" destOrd="0" presId="urn:microsoft.com/office/officeart/2005/8/layout/lProcess2"/>
-    <dgm:cxn modelId="{F096C520-758A-5D49-8651-179AA3120D78}" type="presOf" srcId="{5E5733B1-5C32-F547-80D4-E4B096BF03CA}" destId="{5698ACED-139F-2045-B418-094D89CA2898}" srcOrd="0" destOrd="0" presId="urn:microsoft.com/office/officeart/2005/8/layout/lProcess2"/>
     <dgm:cxn modelId="{42C73260-F027-3F44-8257-FA9227E4EEBB}" type="presParOf" srcId="{BBF17B63-3BF2-174D-8AB1-9AF04C0CF059}" destId="{03EC654D-9096-9847-B271-E9C1CBFF8C60}" srcOrd="0" destOrd="0" presId="urn:microsoft.com/office/officeart/2005/8/layout/lProcess2"/>
     <dgm:cxn modelId="{37AE1E11-310A-8C48-9951-C15670B44855}" type="presParOf" srcId="{03EC654D-9096-9847-B271-E9C1CBFF8C60}" destId="{00FBA305-74BC-7F4E-BC9E-FD61B00BBA6F}" srcOrd="0" destOrd="0" presId="urn:microsoft.com/office/officeart/2005/8/layout/lProcess2"/>
     <dgm:cxn modelId="{A5D07CC7-AA08-534C-8817-A942144DF30E}" type="presParOf" srcId="{03EC654D-9096-9847-B271-E9C1CBFF8C60}" destId="{7DB03529-566B-304D-8FD9-3BA50B1C657A}" srcOrd="1" destOrd="0" presId="urn:microsoft.com/office/officeart/2005/8/layout/lProcess2"/>
@@ -10228,741 +10228,6 @@
       <dsp:cNvGrpSpPr/>
     </dsp:nvGrpSpPr>
     <dsp:grpSpPr/>
-    <dsp:sp modelId="{A76C78DF-6720-4A43-8342-C4D7C307CB79}">
-      <dsp:nvSpPr>
-        <dsp:cNvPr id="0" name=""/>
-        <dsp:cNvSpPr/>
-      </dsp:nvSpPr>
-      <dsp:spPr>
-        <a:xfrm>
-          <a:off x="0" y="1874132"/>
-          <a:ext cx="1283229" cy="513291"/>
-        </a:xfrm>
-        <a:prstGeom prst="chevron">
-          <a:avLst/>
-        </a:prstGeom>
-        <a:gradFill rotWithShape="0">
-          <a:gsLst>
-            <a:gs pos="0">
-              <a:schemeClr val="accent6">
-                <a:shade val="80000"/>
-                <a:hueOff val="0"/>
-                <a:satOff val="0"/>
-                <a:lumOff val="0"/>
-                <a:alphaOff val="0"/>
-                <a:tint val="100000"/>
-                <a:shade val="100000"/>
-                <a:satMod val="130000"/>
-              </a:schemeClr>
-            </a:gs>
-            <a:gs pos="100000">
-              <a:schemeClr val="accent6">
-                <a:shade val="80000"/>
-                <a:hueOff val="0"/>
-                <a:satOff val="0"/>
-                <a:lumOff val="0"/>
-                <a:alphaOff val="0"/>
-                <a:tint val="50000"/>
-                <a:shade val="100000"/>
-                <a:satMod val="350000"/>
-              </a:schemeClr>
-            </a:gs>
-          </a:gsLst>
-          <a:lin ang="16200000" scaled="0"/>
-        </a:gradFill>
-        <a:ln>
-          <a:noFill/>
-        </a:ln>
-        <a:effectLst>
-          <a:outerShdw blurRad="40000" dist="23000" dir="5400000" rotWithShape="0">
-            <a:srgbClr val="000000">
-              <a:alpha val="35000"/>
-            </a:srgbClr>
-          </a:outerShdw>
-        </a:effectLst>
-        <a:scene3d>
-          <a:camera prst="orthographicFront"/>
-          <a:lightRig rig="threePt" dir="t">
-            <a:rot lat="0" lon="0" rev="7500000"/>
-          </a:lightRig>
-        </a:scene3d>
-        <a:sp3d prstMaterial="plastic">
-          <a:bevelT w="127000" h="25400" prst="relaxedInset"/>
-        </a:sp3d>
-      </dsp:spPr>
-      <dsp:style>
-        <a:lnRef idx="0">
-          <a:scrgbClr r="0" g="0" b="0"/>
-        </a:lnRef>
-        <a:fillRef idx="3">
-          <a:scrgbClr r="0" g="0" b="0"/>
-        </a:fillRef>
-        <a:effectRef idx="2">
-          <a:scrgbClr r="0" g="0" b="0"/>
-        </a:effectRef>
-        <a:fontRef idx="minor">
-          <a:schemeClr val="lt1"/>
-        </a:fontRef>
-      </dsp:style>
-      <dsp:txBody>
-        <a:bodyPr spcFirstLastPara="0" vert="horz" wrap="square" lIns="64008" tIns="21336" rIns="21336" bIns="21336" numCol="1" spcCol="1270" anchor="ctr" anchorCtr="0">
-          <a:noAutofit/>
-        </a:bodyPr>
-        <a:lstStyle/>
-        <a:p>
-          <a:pPr lvl="0" algn="ctr" defTabSz="711200">
-            <a:lnSpc>
-              <a:spcPct val="90000"/>
-            </a:lnSpc>
-            <a:spcBef>
-              <a:spcPct val="0"/>
-            </a:spcBef>
-            <a:spcAft>
-              <a:spcPct val="35000"/>
-            </a:spcAft>
-          </a:pPr>
-          <a:r>
-            <a:rPr lang="en-US" sz="1600" kern="1200" dirty="0" smtClean="0"/>
-            <a:t>Design</a:t>
-          </a:r>
-          <a:endParaRPr lang="en-US" sz="1600" kern="1200" dirty="0"/>
-        </a:p>
-      </dsp:txBody>
-      <dsp:txXfrm>
-        <a:off x="256646" y="1874132"/>
-        <a:ext cx="769938" cy="513291"/>
-      </dsp:txXfrm>
-    </dsp:sp>
-    <dsp:sp modelId="{BC2F2DEB-BC5A-5B4F-9F23-B8FF3607950D}">
-      <dsp:nvSpPr>
-        <dsp:cNvPr id="0" name=""/>
-        <dsp:cNvSpPr/>
-      </dsp:nvSpPr>
-      <dsp:spPr>
-        <a:xfrm>
-          <a:off x="1154906" y="1874132"/>
-          <a:ext cx="1283229" cy="513291"/>
-        </a:xfrm>
-        <a:prstGeom prst="chevron">
-          <a:avLst/>
-        </a:prstGeom>
-        <a:gradFill rotWithShape="0">
-          <a:gsLst>
-            <a:gs pos="0">
-              <a:schemeClr val="accent6">
-                <a:shade val="80000"/>
-                <a:hueOff val="-63615"/>
-                <a:satOff val="2835"/>
-                <a:lumOff val="3963"/>
-                <a:alphaOff val="0"/>
-                <a:tint val="100000"/>
-                <a:shade val="100000"/>
-                <a:satMod val="130000"/>
-              </a:schemeClr>
-            </a:gs>
-            <a:gs pos="100000">
-              <a:schemeClr val="accent6">
-                <a:shade val="80000"/>
-                <a:hueOff val="-63615"/>
-                <a:satOff val="2835"/>
-                <a:lumOff val="3963"/>
-                <a:alphaOff val="0"/>
-                <a:tint val="50000"/>
-                <a:shade val="100000"/>
-                <a:satMod val="350000"/>
-              </a:schemeClr>
-            </a:gs>
-          </a:gsLst>
-          <a:lin ang="16200000" scaled="0"/>
-        </a:gradFill>
-        <a:ln>
-          <a:noFill/>
-        </a:ln>
-        <a:effectLst>
-          <a:outerShdw blurRad="40000" dist="23000" dir="5400000" rotWithShape="0">
-            <a:srgbClr val="000000">
-              <a:alpha val="35000"/>
-            </a:srgbClr>
-          </a:outerShdw>
-        </a:effectLst>
-        <a:scene3d>
-          <a:camera prst="orthographicFront"/>
-          <a:lightRig rig="threePt" dir="t">
-            <a:rot lat="0" lon="0" rev="7500000"/>
-          </a:lightRig>
-        </a:scene3d>
-        <a:sp3d prstMaterial="plastic">
-          <a:bevelT w="127000" h="25400" prst="relaxedInset"/>
-        </a:sp3d>
-      </dsp:spPr>
-      <dsp:style>
-        <a:lnRef idx="0">
-          <a:scrgbClr r="0" g="0" b="0"/>
-        </a:lnRef>
-        <a:fillRef idx="3">
-          <a:scrgbClr r="0" g="0" b="0"/>
-        </a:fillRef>
-        <a:effectRef idx="2">
-          <a:scrgbClr r="0" g="0" b="0"/>
-        </a:effectRef>
-        <a:fontRef idx="minor">
-          <a:schemeClr val="lt1"/>
-        </a:fontRef>
-      </dsp:style>
-      <dsp:txBody>
-        <a:bodyPr spcFirstLastPara="0" vert="horz" wrap="square" lIns="64008" tIns="21336" rIns="21336" bIns="21336" numCol="1" spcCol="1270" anchor="ctr" anchorCtr="0">
-          <a:noAutofit/>
-        </a:bodyPr>
-        <a:lstStyle/>
-        <a:p>
-          <a:pPr lvl="0" algn="ctr" defTabSz="711200">
-            <a:lnSpc>
-              <a:spcPct val="90000"/>
-            </a:lnSpc>
-            <a:spcBef>
-              <a:spcPct val="0"/>
-            </a:spcBef>
-            <a:spcAft>
-              <a:spcPct val="35000"/>
-            </a:spcAft>
-          </a:pPr>
-          <a:r>
-            <a:rPr lang="en-US" sz="1600" kern="1200" dirty="0" smtClean="0"/>
-            <a:t>Code</a:t>
-          </a:r>
-          <a:endParaRPr lang="en-US" sz="1600" kern="1200" dirty="0"/>
-        </a:p>
-      </dsp:txBody>
-      <dsp:txXfrm>
-        <a:off x="1411552" y="1874132"/>
-        <a:ext cx="769938" cy="513291"/>
-      </dsp:txXfrm>
-    </dsp:sp>
-    <dsp:sp modelId="{28BD943A-56F3-2E40-AAA9-C50EBB08F6D4}">
-      <dsp:nvSpPr>
-        <dsp:cNvPr id="0" name=""/>
-        <dsp:cNvSpPr/>
-      </dsp:nvSpPr>
-      <dsp:spPr>
-        <a:xfrm>
-          <a:off x="2309812" y="1874132"/>
-          <a:ext cx="1283229" cy="513291"/>
-        </a:xfrm>
-        <a:prstGeom prst="chevron">
-          <a:avLst/>
-        </a:prstGeom>
-        <a:gradFill rotWithShape="0">
-          <a:gsLst>
-            <a:gs pos="0">
-              <a:schemeClr val="accent6">
-                <a:shade val="80000"/>
-                <a:hueOff val="-127230"/>
-                <a:satOff val="5670"/>
-                <a:lumOff val="7926"/>
-                <a:alphaOff val="0"/>
-                <a:tint val="100000"/>
-                <a:shade val="100000"/>
-                <a:satMod val="130000"/>
-              </a:schemeClr>
-            </a:gs>
-            <a:gs pos="100000">
-              <a:schemeClr val="accent6">
-                <a:shade val="80000"/>
-                <a:hueOff val="-127230"/>
-                <a:satOff val="5670"/>
-                <a:lumOff val="7926"/>
-                <a:alphaOff val="0"/>
-                <a:tint val="50000"/>
-                <a:shade val="100000"/>
-                <a:satMod val="350000"/>
-              </a:schemeClr>
-            </a:gs>
-          </a:gsLst>
-          <a:lin ang="16200000" scaled="0"/>
-        </a:gradFill>
-        <a:ln>
-          <a:noFill/>
-        </a:ln>
-        <a:effectLst>
-          <a:outerShdw blurRad="40000" dist="23000" dir="5400000" rotWithShape="0">
-            <a:srgbClr val="000000">
-              <a:alpha val="35000"/>
-            </a:srgbClr>
-          </a:outerShdw>
-        </a:effectLst>
-        <a:scene3d>
-          <a:camera prst="orthographicFront"/>
-          <a:lightRig rig="threePt" dir="t">
-            <a:rot lat="0" lon="0" rev="7500000"/>
-          </a:lightRig>
-        </a:scene3d>
-        <a:sp3d prstMaterial="plastic">
-          <a:bevelT w="127000" h="25400" prst="relaxedInset"/>
-        </a:sp3d>
-      </dsp:spPr>
-      <dsp:style>
-        <a:lnRef idx="0">
-          <a:scrgbClr r="0" g="0" b="0"/>
-        </a:lnRef>
-        <a:fillRef idx="3">
-          <a:scrgbClr r="0" g="0" b="0"/>
-        </a:fillRef>
-        <a:effectRef idx="2">
-          <a:scrgbClr r="0" g="0" b="0"/>
-        </a:effectRef>
-        <a:fontRef idx="minor">
-          <a:schemeClr val="lt1"/>
-        </a:fontRef>
-      </dsp:style>
-      <dsp:txBody>
-        <a:bodyPr spcFirstLastPara="0" vert="horz" wrap="square" lIns="64008" tIns="21336" rIns="21336" bIns="21336" numCol="1" spcCol="1270" anchor="ctr" anchorCtr="0">
-          <a:noAutofit/>
-        </a:bodyPr>
-        <a:lstStyle/>
-        <a:p>
-          <a:pPr lvl="0" algn="ctr" defTabSz="711200">
-            <a:lnSpc>
-              <a:spcPct val="90000"/>
-            </a:lnSpc>
-            <a:spcBef>
-              <a:spcPct val="0"/>
-            </a:spcBef>
-            <a:spcAft>
-              <a:spcPct val="35000"/>
-            </a:spcAft>
-          </a:pPr>
-          <a:r>
-            <a:rPr lang="en-US" sz="1600" kern="1200" dirty="0" smtClean="0"/>
-            <a:t>Build</a:t>
-          </a:r>
-          <a:endParaRPr lang="en-US" sz="1600" kern="1200" dirty="0"/>
-        </a:p>
-      </dsp:txBody>
-      <dsp:txXfrm>
-        <a:off x="2566458" y="1874132"/>
-        <a:ext cx="769938" cy="513291"/>
-      </dsp:txXfrm>
-    </dsp:sp>
-    <dsp:sp modelId="{6C0301AB-BB41-9E45-A0A9-E988787F98E9}">
-      <dsp:nvSpPr>
-        <dsp:cNvPr id="0" name=""/>
-        <dsp:cNvSpPr/>
-      </dsp:nvSpPr>
-      <dsp:spPr>
-        <a:xfrm>
-          <a:off x="3464718" y="1874132"/>
-          <a:ext cx="1283229" cy="513291"/>
-        </a:xfrm>
-        <a:prstGeom prst="chevron">
-          <a:avLst/>
-        </a:prstGeom>
-        <a:gradFill rotWithShape="0">
-          <a:gsLst>
-            <a:gs pos="0">
-              <a:schemeClr val="accent6">
-                <a:shade val="80000"/>
-                <a:hueOff val="-190846"/>
-                <a:satOff val="8505"/>
-                <a:lumOff val="11889"/>
-                <a:alphaOff val="0"/>
-                <a:tint val="100000"/>
-                <a:shade val="100000"/>
-                <a:satMod val="130000"/>
-              </a:schemeClr>
-            </a:gs>
-            <a:gs pos="100000">
-              <a:schemeClr val="accent6">
-                <a:shade val="80000"/>
-                <a:hueOff val="-190846"/>
-                <a:satOff val="8505"/>
-                <a:lumOff val="11889"/>
-                <a:alphaOff val="0"/>
-                <a:tint val="50000"/>
-                <a:shade val="100000"/>
-                <a:satMod val="350000"/>
-              </a:schemeClr>
-            </a:gs>
-          </a:gsLst>
-          <a:lin ang="16200000" scaled="0"/>
-        </a:gradFill>
-        <a:ln>
-          <a:noFill/>
-        </a:ln>
-        <a:effectLst>
-          <a:outerShdw blurRad="40000" dist="23000" dir="5400000" rotWithShape="0">
-            <a:srgbClr val="000000">
-              <a:alpha val="35000"/>
-            </a:srgbClr>
-          </a:outerShdw>
-        </a:effectLst>
-        <a:scene3d>
-          <a:camera prst="orthographicFront"/>
-          <a:lightRig rig="threePt" dir="t">
-            <a:rot lat="0" lon="0" rev="7500000"/>
-          </a:lightRig>
-        </a:scene3d>
-        <a:sp3d prstMaterial="plastic">
-          <a:bevelT w="127000" h="25400" prst="relaxedInset"/>
-        </a:sp3d>
-      </dsp:spPr>
-      <dsp:style>
-        <a:lnRef idx="0">
-          <a:scrgbClr r="0" g="0" b="0"/>
-        </a:lnRef>
-        <a:fillRef idx="3">
-          <a:scrgbClr r="0" g="0" b="0"/>
-        </a:fillRef>
-        <a:effectRef idx="2">
-          <a:scrgbClr r="0" g="0" b="0"/>
-        </a:effectRef>
-        <a:fontRef idx="minor">
-          <a:schemeClr val="lt1"/>
-        </a:fontRef>
-      </dsp:style>
-      <dsp:txBody>
-        <a:bodyPr spcFirstLastPara="0" vert="horz" wrap="square" lIns="64008" tIns="21336" rIns="21336" bIns="21336" numCol="1" spcCol="1270" anchor="ctr" anchorCtr="0">
-          <a:noAutofit/>
-        </a:bodyPr>
-        <a:lstStyle/>
-        <a:p>
-          <a:pPr lvl="0" algn="ctr" defTabSz="711200">
-            <a:lnSpc>
-              <a:spcPct val="90000"/>
-            </a:lnSpc>
-            <a:spcBef>
-              <a:spcPct val="0"/>
-            </a:spcBef>
-            <a:spcAft>
-              <a:spcPct val="35000"/>
-            </a:spcAft>
-          </a:pPr>
-          <a:r>
-            <a:rPr lang="en-US" sz="1600" kern="1200" dirty="0" smtClean="0"/>
-            <a:t>Test</a:t>
-          </a:r>
-          <a:endParaRPr lang="en-US" sz="1600" kern="1200" dirty="0"/>
-        </a:p>
-      </dsp:txBody>
-      <dsp:txXfrm>
-        <a:off x="3721364" y="1874132"/>
-        <a:ext cx="769938" cy="513291"/>
-      </dsp:txXfrm>
-    </dsp:sp>
-    <dsp:sp modelId="{9E7D9B46-CE06-384A-A848-0AD8A3C68BCA}">
-      <dsp:nvSpPr>
-        <dsp:cNvPr id="0" name=""/>
-        <dsp:cNvSpPr/>
-      </dsp:nvSpPr>
-      <dsp:spPr>
-        <a:xfrm>
-          <a:off x="4619625" y="1874132"/>
-          <a:ext cx="1283229" cy="513291"/>
-        </a:xfrm>
-        <a:prstGeom prst="chevron">
-          <a:avLst/>
-        </a:prstGeom>
-        <a:gradFill rotWithShape="0">
-          <a:gsLst>
-            <a:gs pos="0">
-              <a:schemeClr val="accent6">
-                <a:shade val="80000"/>
-                <a:hueOff val="-254461"/>
-                <a:satOff val="11339"/>
-                <a:lumOff val="15853"/>
-                <a:alphaOff val="0"/>
-                <a:tint val="100000"/>
-                <a:shade val="100000"/>
-                <a:satMod val="130000"/>
-              </a:schemeClr>
-            </a:gs>
-            <a:gs pos="100000">
-              <a:schemeClr val="accent6">
-                <a:shade val="80000"/>
-                <a:hueOff val="-254461"/>
-                <a:satOff val="11339"/>
-                <a:lumOff val="15853"/>
-                <a:alphaOff val="0"/>
-                <a:tint val="50000"/>
-                <a:shade val="100000"/>
-                <a:satMod val="350000"/>
-              </a:schemeClr>
-            </a:gs>
-          </a:gsLst>
-          <a:lin ang="16200000" scaled="0"/>
-        </a:gradFill>
-        <a:ln>
-          <a:noFill/>
-        </a:ln>
-        <a:effectLst>
-          <a:outerShdw blurRad="40000" dist="23000" dir="5400000" rotWithShape="0">
-            <a:srgbClr val="000000">
-              <a:alpha val="35000"/>
-            </a:srgbClr>
-          </a:outerShdw>
-        </a:effectLst>
-        <a:scene3d>
-          <a:camera prst="orthographicFront"/>
-          <a:lightRig rig="threePt" dir="t">
-            <a:rot lat="0" lon="0" rev="7500000"/>
-          </a:lightRig>
-        </a:scene3d>
-        <a:sp3d prstMaterial="plastic">
-          <a:bevelT w="127000" h="25400" prst="relaxedInset"/>
-        </a:sp3d>
-      </dsp:spPr>
-      <dsp:style>
-        <a:lnRef idx="0">
-          <a:scrgbClr r="0" g="0" b="0"/>
-        </a:lnRef>
-        <a:fillRef idx="3">
-          <a:scrgbClr r="0" g="0" b="0"/>
-        </a:fillRef>
-        <a:effectRef idx="2">
-          <a:scrgbClr r="0" g="0" b="0"/>
-        </a:effectRef>
-        <a:fontRef idx="minor">
-          <a:schemeClr val="lt1"/>
-        </a:fontRef>
-      </dsp:style>
-      <dsp:txBody>
-        <a:bodyPr spcFirstLastPara="0" vert="horz" wrap="square" lIns="64008" tIns="21336" rIns="21336" bIns="21336" numCol="1" spcCol="1270" anchor="ctr" anchorCtr="0">
-          <a:noAutofit/>
-        </a:bodyPr>
-        <a:lstStyle/>
-        <a:p>
-          <a:pPr lvl="0" algn="ctr" defTabSz="711200">
-            <a:lnSpc>
-              <a:spcPct val="90000"/>
-            </a:lnSpc>
-            <a:spcBef>
-              <a:spcPct val="0"/>
-            </a:spcBef>
-            <a:spcAft>
-              <a:spcPct val="35000"/>
-            </a:spcAft>
-          </a:pPr>
-          <a:r>
-            <a:rPr lang="en-US" sz="1600" kern="1200" dirty="0" smtClean="0"/>
-            <a:t>Release</a:t>
-          </a:r>
-          <a:endParaRPr lang="en-US" sz="1600" kern="1200" dirty="0"/>
-        </a:p>
-      </dsp:txBody>
-      <dsp:txXfrm>
-        <a:off x="4876271" y="1874132"/>
-        <a:ext cx="769938" cy="513291"/>
-      </dsp:txXfrm>
-    </dsp:sp>
-    <dsp:sp modelId="{71B081E3-B866-C940-9539-EDA829B14E20}">
-      <dsp:nvSpPr>
-        <dsp:cNvPr id="0" name=""/>
-        <dsp:cNvSpPr/>
-      </dsp:nvSpPr>
-      <dsp:spPr>
-        <a:xfrm>
-          <a:off x="5774531" y="1874132"/>
-          <a:ext cx="1283229" cy="513291"/>
-        </a:xfrm>
-        <a:prstGeom prst="chevron">
-          <a:avLst/>
-        </a:prstGeom>
-        <a:gradFill rotWithShape="0">
-          <a:gsLst>
-            <a:gs pos="0">
-              <a:schemeClr val="accent6">
-                <a:shade val="80000"/>
-                <a:hueOff val="-318076"/>
-                <a:satOff val="14174"/>
-                <a:lumOff val="19816"/>
-                <a:alphaOff val="0"/>
-                <a:tint val="100000"/>
-                <a:shade val="100000"/>
-                <a:satMod val="130000"/>
-              </a:schemeClr>
-            </a:gs>
-            <a:gs pos="100000">
-              <a:schemeClr val="accent6">
-                <a:shade val="80000"/>
-                <a:hueOff val="-318076"/>
-                <a:satOff val="14174"/>
-                <a:lumOff val="19816"/>
-                <a:alphaOff val="0"/>
-                <a:tint val="50000"/>
-                <a:shade val="100000"/>
-                <a:satMod val="350000"/>
-              </a:schemeClr>
-            </a:gs>
-          </a:gsLst>
-          <a:lin ang="16200000" scaled="0"/>
-        </a:gradFill>
-        <a:ln>
-          <a:noFill/>
-        </a:ln>
-        <a:effectLst>
-          <a:outerShdw blurRad="40000" dist="23000" dir="5400000" rotWithShape="0">
-            <a:srgbClr val="000000">
-              <a:alpha val="35000"/>
-            </a:srgbClr>
-          </a:outerShdw>
-        </a:effectLst>
-        <a:scene3d>
-          <a:camera prst="orthographicFront"/>
-          <a:lightRig rig="threePt" dir="t">
-            <a:rot lat="0" lon="0" rev="7500000"/>
-          </a:lightRig>
-        </a:scene3d>
-        <a:sp3d prstMaterial="plastic">
-          <a:bevelT w="127000" h="25400" prst="relaxedInset"/>
-        </a:sp3d>
-      </dsp:spPr>
-      <dsp:style>
-        <a:lnRef idx="0">
-          <a:scrgbClr r="0" g="0" b="0"/>
-        </a:lnRef>
-        <a:fillRef idx="3">
-          <a:scrgbClr r="0" g="0" b="0"/>
-        </a:fillRef>
-        <a:effectRef idx="2">
-          <a:scrgbClr r="0" g="0" b="0"/>
-        </a:effectRef>
-        <a:fontRef idx="minor">
-          <a:schemeClr val="lt1"/>
-        </a:fontRef>
-      </dsp:style>
-      <dsp:txBody>
-        <a:bodyPr spcFirstLastPara="0" vert="horz" wrap="square" lIns="64008" tIns="21336" rIns="21336" bIns="21336" numCol="1" spcCol="1270" anchor="ctr" anchorCtr="0">
-          <a:noAutofit/>
-        </a:bodyPr>
-        <a:lstStyle/>
-        <a:p>
-          <a:pPr lvl="0" algn="ctr" defTabSz="711200">
-            <a:lnSpc>
-              <a:spcPct val="90000"/>
-            </a:lnSpc>
-            <a:spcBef>
-              <a:spcPct val="0"/>
-            </a:spcBef>
-            <a:spcAft>
-              <a:spcPct val="35000"/>
-            </a:spcAft>
-          </a:pPr>
-          <a:r>
-            <a:rPr lang="en-US" sz="1600" kern="1200" dirty="0" smtClean="0"/>
-            <a:t>Deploy</a:t>
-          </a:r>
-          <a:endParaRPr lang="en-US" sz="1600" kern="1200" dirty="0"/>
-        </a:p>
-      </dsp:txBody>
-      <dsp:txXfrm>
-        <a:off x="6031177" y="1874132"/>
-        <a:ext cx="769938" cy="513291"/>
-      </dsp:txXfrm>
-    </dsp:sp>
-    <dsp:sp modelId="{5F932FCC-4439-4744-9BE5-98304E29846B}">
-      <dsp:nvSpPr>
-        <dsp:cNvPr id="0" name=""/>
-        <dsp:cNvSpPr/>
-      </dsp:nvSpPr>
-      <dsp:spPr>
-        <a:xfrm>
-          <a:off x="6929437" y="1874132"/>
-          <a:ext cx="1283229" cy="513291"/>
-        </a:xfrm>
-        <a:prstGeom prst="chevron">
-          <a:avLst/>
-        </a:prstGeom>
-        <a:gradFill rotWithShape="0">
-          <a:gsLst>
-            <a:gs pos="0">
-              <a:schemeClr val="accent6">
-                <a:shade val="80000"/>
-                <a:hueOff val="-381691"/>
-                <a:satOff val="17009"/>
-                <a:lumOff val="23779"/>
-                <a:alphaOff val="0"/>
-                <a:tint val="100000"/>
-                <a:shade val="100000"/>
-                <a:satMod val="130000"/>
-              </a:schemeClr>
-            </a:gs>
-            <a:gs pos="100000">
-              <a:schemeClr val="accent6">
-                <a:shade val="80000"/>
-                <a:hueOff val="-381691"/>
-                <a:satOff val="17009"/>
-                <a:lumOff val="23779"/>
-                <a:alphaOff val="0"/>
-                <a:tint val="50000"/>
-                <a:shade val="100000"/>
-                <a:satMod val="350000"/>
-              </a:schemeClr>
-            </a:gs>
-          </a:gsLst>
-          <a:lin ang="16200000" scaled="0"/>
-        </a:gradFill>
-        <a:ln>
-          <a:noFill/>
-        </a:ln>
-        <a:effectLst>
-          <a:outerShdw blurRad="40000" dist="23000" dir="5400000" rotWithShape="0">
-            <a:srgbClr val="000000">
-              <a:alpha val="35000"/>
-            </a:srgbClr>
-          </a:outerShdw>
-        </a:effectLst>
-        <a:scene3d>
-          <a:camera prst="orthographicFront"/>
-          <a:lightRig rig="threePt" dir="t">
-            <a:rot lat="0" lon="0" rev="7500000"/>
-          </a:lightRig>
-        </a:scene3d>
-        <a:sp3d prstMaterial="plastic">
-          <a:bevelT w="127000" h="25400" prst="relaxedInset"/>
-        </a:sp3d>
-      </dsp:spPr>
-      <dsp:style>
-        <a:lnRef idx="0">
-          <a:scrgbClr r="0" g="0" b="0"/>
-        </a:lnRef>
-        <a:fillRef idx="3">
-          <a:scrgbClr r="0" g="0" b="0"/>
-        </a:fillRef>
-        <a:effectRef idx="2">
-          <a:scrgbClr r="0" g="0" b="0"/>
-        </a:effectRef>
-        <a:fontRef idx="minor">
-          <a:schemeClr val="lt1"/>
-        </a:fontRef>
-      </dsp:style>
-      <dsp:txBody>
-        <a:bodyPr spcFirstLastPara="0" vert="horz" wrap="square" lIns="64008" tIns="21336" rIns="21336" bIns="21336" numCol="1" spcCol="1270" anchor="ctr" anchorCtr="0">
-          <a:noAutofit/>
-        </a:bodyPr>
-        <a:lstStyle/>
-        <a:p>
-          <a:pPr lvl="0" algn="ctr" defTabSz="711200">
-            <a:lnSpc>
-              <a:spcPct val="90000"/>
-            </a:lnSpc>
-            <a:spcBef>
-              <a:spcPct val="0"/>
-            </a:spcBef>
-            <a:spcAft>
-              <a:spcPct val="35000"/>
-            </a:spcAft>
-          </a:pPr>
-          <a:r>
-            <a:rPr lang="en-US" sz="1600" kern="1200" dirty="0" smtClean="0"/>
-            <a:t>Operate</a:t>
-          </a:r>
-          <a:endParaRPr lang="en-US" sz="1600" kern="1200" dirty="0"/>
-        </a:p>
-      </dsp:txBody>
-      <dsp:txXfrm>
-        <a:off x="7186083" y="1874132"/>
-        <a:ext cx="769938" cy="513291"/>
-      </dsp:txXfrm>
-    </dsp:sp>
   </dsp:spTree>
 </dsp:drawing>
 </file>
@@ -22965,6 +22230,44 @@
           <a:bodyPr/>
           <a:lstStyle/>
           <a:p>
+            <a:r>
+              <a:rPr lang="en-US" dirty="0" smtClean="0"/>
+              <a:t>Agile For Operations – 2009 – then 2010  DevOps  (Velocity conferences – check them out)</a:t>
+            </a:r>
+          </a:p>
+          <a:p>
+            <a:r>
+              <a:rPr lang="en-US" dirty="0" smtClean="0"/>
+              <a:t>Attempts</a:t>
+            </a:r>
+            <a:r>
+              <a:rPr lang="en-US" baseline="0" dirty="0" smtClean="0"/>
+              <a:t> to use Agile for Operations – Scrum</a:t>
+            </a:r>
+          </a:p>
+          <a:p>
+            <a:r>
+              <a:rPr lang="en-US" baseline="0" dirty="0" smtClean="0"/>
+              <a:t>Failure:</a:t>
+            </a:r>
+          </a:p>
+          <a:p>
+            <a:r>
+              <a:rPr lang="en-US" dirty="0" smtClean="0"/>
+              <a:t>From The </a:t>
+            </a:r>
+            <a:r>
+              <a:rPr lang="en-US" smtClean="0"/>
+              <a:t>Phoenix</a:t>
+            </a:r>
+            <a:r>
+              <a:rPr lang="en-US" baseline="0" smtClean="0"/>
+              <a:t> Project - </a:t>
+            </a:r>
+            <a:r>
+              <a:rPr lang="en-US" smtClean="0"/>
+              <a:t> Gene Kim</a:t>
+            </a:r>
             <a:endParaRPr lang="en-US" dirty="0"/>
           </a:p>
         </p:txBody>
@@ -22995,7 +22298,7 @@
     </p:spTree>
     <p:extLst>
       <p:ext uri="{BB962C8B-B14F-4D97-AF65-F5344CB8AC3E}">
-        <p14:creationId xmlns:p14="http://schemas.microsoft.com/office/powerpoint/2010/main" val="3579993731"/>
+        <p14:creationId xmlns:p14="http://schemas.microsoft.com/office/powerpoint/2010/main" val="358046350"/>
       </p:ext>
     </p:extLst>
   </p:cSld>
@@ -29445,7 +28748,7 @@
     <mc:Choice Requires="p14">
       <p:transition spd="slow" p14:dur="2000"/>
     </mc:Choice>
-    <mc:Fallback xmlns="" xmlns:mv="urn:schemas-microsoft-com:mac:vml">
+    <mc:Fallback xmlns:mv="urn:schemas-microsoft-com:mac:vml" xmlns="">
       <p:transition spd="slow"/>
     </mc:Fallback>
   </mc:AlternateContent>
@@ -39119,7 +38422,6 @@
               <a:rPr lang="en-US" sz="4600" dirty="0" smtClean="0"/>
               <a:t>Behavior change – culture will follow</a:t>
             </a:r>
-            <a:endParaRPr lang="en-US" sz="4600" dirty="0" smtClean="0"/>
           </a:p>
         </p:txBody>
       </p:sp>
@@ -40606,21 +39908,14 @@
             <p:ph type="title"/>
           </p:nvPr>
         </p:nvSpPr>
-        <p:spPr>
-          <a:xfrm>
-            <a:off x="438678" y="323165"/>
-            <a:ext cx="8229600" cy="646331"/>
-          </a:xfrm>
-        </p:spPr>
+        <p:spPr/>
         <p:txBody>
-          <a:bodyPr>
-            <a:normAutofit fontScale="90000"/>
-          </a:bodyPr>
+          <a:bodyPr/>
           <a:lstStyle/>
           <a:p>
             <a:r>
               <a:rPr lang="en-US" dirty="0" smtClean="0"/>
-              <a:t>DevOps</a:t>
+              <a:t>Agile Operations</a:t>
             </a:r>
             <a:endParaRPr lang="en-US" dirty="0"/>
           </a:p>
@@ -40628,44 +39923,69 @@
       </p:sp>
       <p:sp>
         <p:nvSpPr>
-          <p:cNvPr id="4" name="Slide Number Placeholder 3"/>
+          <p:cNvPr id="3" name="Content Placeholder 2"/>
           <p:cNvSpPr>
             <a:spLocks noGrp="1"/>
           </p:cNvSpPr>
           <p:nvPr>
-            <p:ph type="sldNum" sz="quarter" idx="10"/>
+            <p:ph idx="1"/>
           </p:nvPr>
         </p:nvSpPr>
-        <p:spPr/>
+        <p:spPr>
+          <a:xfrm>
+            <a:off x="457200" y="1140748"/>
+            <a:ext cx="8229600" cy="4525963"/>
+          </a:xfrm>
+        </p:spPr>
         <p:txBody>
           <a:bodyPr/>
           <a:lstStyle/>
           <a:p>
-            <a:pPr>
-              <a:defRPr/>
+            <a:pPr marL="0" indent="0">
+              <a:buNone/>
             </a:pPr>
-            <a:fld id="{2D118A52-EDC5-42B9-AEFF-70EBA4319419}" type="slidenum">
-              <a:rPr lang="en-US" smtClean="0">
-                <a:solidFill>
-                  <a:srgbClr val="FFFFFF"/>
-                </a:solidFill>
-              </a:rPr>
-              <a:pPr>
-                <a:defRPr/>
-              </a:pPr>
-              <a:t>6</a:t>
-            </a:fld>
-            <a:endParaRPr lang="en-US" dirty="0">
-              <a:solidFill>
-                <a:srgbClr val="FFFFFF"/>
-              </a:solidFill>
-            </a:endParaRPr>
+            <a:r>
+              <a:rPr lang="en-US" dirty="0"/>
+              <a:t>Operations has 4 Work Types:</a:t>
+            </a:r>
+          </a:p>
+          <a:p>
+            <a:r>
+              <a:rPr lang="en-US" dirty="0"/>
+              <a:t>1.Business Projects (</a:t>
+            </a:r>
+            <a:r>
+              <a:rPr lang="en-US" dirty="0" smtClean="0"/>
+              <a:t>New Service)</a:t>
+            </a:r>
+            <a:endParaRPr lang="en-US" dirty="0"/>
+          </a:p>
+          <a:p>
+            <a:r>
+              <a:rPr lang="en-US" dirty="0"/>
+              <a:t>2.Internal Projects (Implement CM)</a:t>
+            </a:r>
+          </a:p>
+          <a:p>
+            <a:r>
+              <a:rPr lang="en-US" dirty="0"/>
+              <a:t>3.Planned Changes (Tickets)</a:t>
+            </a:r>
+          </a:p>
+          <a:p>
+            <a:r>
+              <a:rPr lang="en-US" dirty="0"/>
+              <a:t>4. Unplanned Changes (Break-fix)</a:t>
+            </a:r>
+          </a:p>
+          <a:p>
+            <a:endParaRPr lang="en-US" dirty="0"/>
           </a:p>
         </p:txBody>
       </p:sp>
       <p:pic>
         <p:nvPicPr>
-          <p:cNvPr id="6" name="Picture 5"/>
+          <p:cNvPr id="4" name="Picture 3"/>
           <p:cNvPicPr>
             <a:picLocks noChangeAspect="1"/>
           </p:cNvPicPr>
@@ -40679,8 +39999,8 @@
         </p:blipFill>
         <p:spPr>
           <a:xfrm>
-            <a:off x="956667" y="1482755"/>
-            <a:ext cx="7711611" cy="4158703"/>
+            <a:off x="457200" y="4108044"/>
+            <a:ext cx="7711611" cy="2678494"/>
           </a:xfrm>
           <a:prstGeom prst="rect">
             <a:avLst/>
@@ -40690,7 +40010,7 @@
     </p:spTree>
     <p:extLst>
       <p:ext uri="{BB962C8B-B14F-4D97-AF65-F5344CB8AC3E}">
-        <p14:creationId xmlns:p14="http://schemas.microsoft.com/office/powerpoint/2010/main" val="2076442870"/>
+        <p14:creationId xmlns:p14="http://schemas.microsoft.com/office/powerpoint/2010/main" val="1869886928"/>
       </p:ext>
     </p:extLst>
   </p:cSld>
@@ -41106,7 +40426,6 @@
               <a:rPr lang="en-US" sz="2300" dirty="0"/>
               <a:t>short lead times) </a:t>
             </a:r>
-            <a:endParaRPr lang="en-US" sz="2300" dirty="0"/>
           </a:p>
         </p:txBody>
       </p:sp>
@@ -41244,7 +40563,6 @@
               <a:rPr lang="en-US" sz="3200" dirty="0"/>
               <a:t>without gates </a:t>
             </a:r>
-            <a:endParaRPr lang="en-US" sz="3200" dirty="0"/>
           </a:p>
         </p:txBody>
       </p:sp>

</xml_diff>

<commit_message>
ALFDevOps.pptx - Updated Slide # 6 to include 4 Ops work types - note update
</commit_message>
<xml_diff>
--- a/ALFDevOps.pptx
+++ b/ALFDevOps.pptx
@@ -22248,24 +22248,25 @@
           <a:p>
             <a:r>
               <a:rPr lang="en-US" baseline="0" dirty="0" smtClean="0"/>
-              <a:t>Failure:</a:t>
-            </a:r>
+              <a:t>Failure – can </a:t>
+            </a:r>
+            <a:r>
+              <a:rPr lang="en-US" baseline="0" smtClean="0"/>
+              <a:t>timebox</a:t>
+            </a:r>
+            <a:endParaRPr lang="en-US" baseline="0" dirty="0" smtClean="0"/>
           </a:p>
           <a:p>
             <a:r>
               <a:rPr lang="en-US" dirty="0" smtClean="0"/>
-              <a:t>From The </a:t>
-            </a:r>
-            <a:r>
-              <a:rPr lang="en-US" smtClean="0"/>
-              <a:t>Phoenix</a:t>
-            </a:r>
-            <a:r>
-              <a:rPr lang="en-US" baseline="0" smtClean="0"/>
+              <a:t>From The Phoenix</a:t>
+            </a:r>
+            <a:r>
+              <a:rPr lang="en-US" baseline="0" dirty="0" smtClean="0"/>
               <a:t> Project - </a:t>
             </a:r>
             <a:r>
-              <a:rPr lang="en-US" smtClean="0"/>
+              <a:rPr lang="en-US" dirty="0" smtClean="0"/>
               <a:t> Gene Kim</a:t>
             </a:r>
             <a:endParaRPr lang="en-US" dirty="0"/>

</xml_diff>